<commit_message>
add about presentation location - github
</commit_message>
<xml_diff>
--- a/PrimulaSecondPresentation/slides.pptx
+++ b/PrimulaSecondPresentation/slides.pptx
@@ -5852,6 +5852,13 @@
   <p:clrMapOvr>
     <a:masterClrMapping/>
   </p:clrMapOvr>
+  <p:timing>
+    <p:tnLst>
+      <p:par>
+        <p:cTn id="1" dur="indefinite" restart="never" nodeType="tmRoot"/>
+      </p:par>
+    </p:tnLst>
+  </p:timing>
 </p:sld>
 </file>
 
@@ -5979,6 +5986,13 @@
   <p:clrMapOvr>
     <a:masterClrMapping/>
   </p:clrMapOvr>
+  <p:timing>
+    <p:tnLst>
+      <p:par>
+        <p:cTn id="1" dur="indefinite" restart="never" nodeType="tmRoot"/>
+      </p:par>
+    </p:tnLst>
+  </p:timing>
 </p:sld>
 </file>
 
@@ -6082,6 +6096,53 @@
           </a:p>
         </p:txBody>
       </p:sp>
+      <p:sp>
+        <p:nvSpPr>
+          <p:cNvPr id="4" name="Prostokąt 3"/>
+          <p:cNvSpPr/>
+          <p:nvPr/>
+        </p:nvSpPr>
+        <p:spPr>
+          <a:xfrm>
+            <a:off x="677334" y="6273225"/>
+            <a:ext cx="6096000" cy="584775"/>
+          </a:xfrm>
+          <a:prstGeom prst="rect">
+            <a:avLst/>
+          </a:prstGeom>
+        </p:spPr>
+        <p:txBody>
+          <a:bodyPr>
+            <a:spAutoFit/>
+          </a:bodyPr>
+          <a:lstStyle/>
+          <a:p>
+            <a:r>
+              <a:rPr lang="pl-PL" sz="1600" dirty="0" smtClean="0"/>
+              <a:t>prezentacja dostępna na </a:t>
+            </a:r>
+            <a:r>
+              <a:rPr lang="pl-PL" sz="1600" dirty="0" smtClean="0">
+                <a:hlinkClick r:id="rId2"/>
+              </a:rPr>
+              <a:t>https</a:t>
+            </a:r>
+            <a:r>
+              <a:rPr lang="pl-PL" sz="1600" dirty="0">
+                <a:hlinkClick r:id="rId2"/>
+              </a:rPr>
+              <a:t>://</a:t>
+            </a:r>
+            <a:r>
+              <a:rPr lang="pl-PL" sz="1600" dirty="0" smtClean="0">
+                <a:hlinkClick r:id="rId2"/>
+              </a:rPr>
+              <a:t>github.com/pawelsawicz/Presentations/</a:t>
+            </a:r>
+            <a:endParaRPr lang="pl-PL" sz="1600" dirty="0"/>
+          </a:p>
+        </p:txBody>
+      </p:sp>
     </p:spTree>
     <p:extLst>
       <p:ext uri="{BB962C8B-B14F-4D97-AF65-F5344CB8AC3E}">
@@ -6092,6 +6153,13 @@
   <p:clrMapOvr>
     <a:masterClrMapping/>
   </p:clrMapOvr>
+  <p:timing>
+    <p:tnLst>
+      <p:par>
+        <p:cTn id="1" dur="indefinite" restart="never" nodeType="tmRoot"/>
+      </p:par>
+    </p:tnLst>
+  </p:timing>
 </p:sld>
 </file>
 

</xml_diff>

<commit_message>
have fixed some gramma issues
</commit_message>
<xml_diff>
--- a/PrimulaSecondPresentation/slides.pptx
+++ b/PrimulaSecondPresentation/slides.pptx
@@ -837,7 +837,7 @@
             <a:fld id="{B61BEF0D-F0BB-DE4B-95CE-6DB70DBA9567}" type="datetimeFigureOut">
               <a:rPr lang="en-US" dirty="0"/>
               <a:pPr/>
-              <a:t>3/17/2014</a:t>
+              <a:t>3/24/2014</a:t>
             </a:fld>
             <a:endParaRPr lang="en-US" dirty="0"/>
           </a:p>
@@ -1085,7 +1085,7 @@
             <a:fld id="{B61BEF0D-F0BB-DE4B-95CE-6DB70DBA9567}" type="datetimeFigureOut">
               <a:rPr lang="en-US" dirty="0"/>
               <a:pPr/>
-              <a:t>3/17/2014</a:t>
+              <a:t>3/24/2014</a:t>
             </a:fld>
             <a:endParaRPr lang="en-US" dirty="0"/>
           </a:p>
@@ -1396,7 +1396,7 @@
             <a:fld id="{B61BEF0D-F0BB-DE4B-95CE-6DB70DBA9567}" type="datetimeFigureOut">
               <a:rPr lang="en-US" dirty="0"/>
               <a:pPr/>
-              <a:t>3/17/2014</a:t>
+              <a:t>3/24/2014</a:t>
             </a:fld>
             <a:endParaRPr lang="en-US" dirty="0"/>
           </a:p>
@@ -1734,7 +1734,7 @@
             <a:fld id="{B61BEF0D-F0BB-DE4B-95CE-6DB70DBA9567}" type="datetimeFigureOut">
               <a:rPr lang="en-US" dirty="0"/>
               <a:pPr/>
-              <a:t>3/17/2014</a:t>
+              <a:t>3/24/2014</a:t>
             </a:fld>
             <a:endParaRPr lang="en-US" dirty="0"/>
           </a:p>
@@ -2045,7 +2045,7 @@
             <a:fld id="{B61BEF0D-F0BB-DE4B-95CE-6DB70DBA9567}" type="datetimeFigureOut">
               <a:rPr lang="en-US" dirty="0"/>
               <a:pPr/>
-              <a:t>3/17/2014</a:t>
+              <a:t>3/24/2014</a:t>
             </a:fld>
             <a:endParaRPr lang="en-US" dirty="0"/>
           </a:p>
@@ -2435,7 +2435,7 @@
             <a:fld id="{B61BEF0D-F0BB-DE4B-95CE-6DB70DBA9567}" type="datetimeFigureOut">
               <a:rPr lang="en-US" dirty="0"/>
               <a:pPr/>
-              <a:t>3/17/2014</a:t>
+              <a:t>3/24/2014</a:t>
             </a:fld>
             <a:endParaRPr lang="en-US" dirty="0"/>
           </a:p>
@@ -2601,7 +2601,7 @@
           <a:p>
             <a:fld id="{55C6B4A9-1611-4792-9094-5F34BCA07E0B}" type="datetimeFigureOut">
               <a:rPr lang="en-US" dirty="0"/>
-              <a:t>3/17/2014</a:t>
+              <a:t>3/24/2014</a:t>
             </a:fld>
             <a:endParaRPr lang="en-US" dirty="0"/>
           </a:p>
@@ -2777,7 +2777,7 @@
             <a:fld id="{B61BEF0D-F0BB-DE4B-95CE-6DB70DBA9567}" type="datetimeFigureOut">
               <a:rPr lang="en-US" dirty="0"/>
               <a:pPr/>
-              <a:t>3/17/2014</a:t>
+              <a:t>3/24/2014</a:t>
             </a:fld>
             <a:endParaRPr lang="en-US" dirty="0"/>
           </a:p>
@@ -2950,7 +2950,7 @@
             <a:fld id="{B61BEF0D-F0BB-DE4B-95CE-6DB70DBA9567}" type="datetimeFigureOut">
               <a:rPr lang="en-US" dirty="0"/>
               <a:pPr/>
-              <a:t>3/17/2014</a:t>
+              <a:t>3/24/2014</a:t>
             </a:fld>
             <a:endParaRPr lang="en-US" dirty="0"/>
           </a:p>
@@ -3194,7 +3194,7 @@
             <a:fld id="{B61BEF0D-F0BB-DE4B-95CE-6DB70DBA9567}" type="datetimeFigureOut">
               <a:rPr lang="en-US" dirty="0"/>
               <a:pPr/>
-              <a:t>3/17/2014</a:t>
+              <a:t>3/24/2014</a:t>
             </a:fld>
             <a:endParaRPr lang="en-US" dirty="0"/>
           </a:p>
@@ -3422,7 +3422,7 @@
           <a:p>
             <a:fld id="{EB712588-04B1-427B-82EE-E8DB90309F08}" type="datetimeFigureOut">
               <a:rPr lang="en-US" dirty="0"/>
-              <a:t>3/17/2014</a:t>
+              <a:t>3/24/2014</a:t>
             </a:fld>
             <a:endParaRPr lang="en-US" dirty="0"/>
           </a:p>
@@ -3792,7 +3792,7 @@
             <a:fld id="{B61BEF0D-F0BB-DE4B-95CE-6DB70DBA9567}" type="datetimeFigureOut">
               <a:rPr lang="en-US" dirty="0"/>
               <a:pPr/>
-              <a:t>3/17/2014</a:t>
+              <a:t>3/24/2014</a:t>
             </a:fld>
             <a:endParaRPr lang="en-US" dirty="0"/>
           </a:p>
@@ -3912,7 +3912,7 @@
             <a:fld id="{B61BEF0D-F0BB-DE4B-95CE-6DB70DBA9567}" type="datetimeFigureOut">
               <a:rPr lang="en-US" dirty="0"/>
               <a:pPr/>
-              <a:t>3/17/2014</a:t>
+              <a:t>3/24/2014</a:t>
             </a:fld>
             <a:endParaRPr lang="en-US" dirty="0"/>
           </a:p>
@@ -4004,7 +4004,7 @@
             <a:fld id="{B61BEF0D-F0BB-DE4B-95CE-6DB70DBA9567}" type="datetimeFigureOut">
               <a:rPr lang="en-US" dirty="0"/>
               <a:pPr/>
-              <a:t>3/17/2014</a:t>
+              <a:t>3/24/2014</a:t>
             </a:fld>
             <a:endParaRPr lang="en-US" dirty="0"/>
           </a:p>
@@ -4255,7 +4255,7 @@
           <a:p>
             <a:fld id="{42A54C80-263E-416B-A8E0-580EDEADCBDC}" type="datetimeFigureOut">
               <a:rPr lang="en-US" dirty="0"/>
-              <a:t>3/17/2014</a:t>
+              <a:t>3/24/2014</a:t>
             </a:fld>
             <a:endParaRPr lang="en-US" dirty="0"/>
           </a:p>
@@ -4514,7 +4514,7 @@
             <a:fld id="{B61BEF0D-F0BB-DE4B-95CE-6DB70DBA9567}" type="datetimeFigureOut">
               <a:rPr lang="en-US" dirty="0"/>
               <a:pPr/>
-              <a:t>3/17/2014</a:t>
+              <a:t>3/24/2014</a:t>
             </a:fld>
             <a:endParaRPr lang="en-US" dirty="0"/>
           </a:p>
@@ -5254,7 +5254,7 @@
             <a:fld id="{B61BEF0D-F0BB-DE4B-95CE-6DB70DBA9567}" type="datetimeFigureOut">
               <a:rPr lang="en-US" dirty="0"/>
               <a:pPr/>
-              <a:t>3/17/2014</a:t>
+              <a:t>3/24/2014</a:t>
             </a:fld>
             <a:endParaRPr lang="en-US" dirty="0"/>
           </a:p>
@@ -6065,24 +6065,27 @@
           <a:p>
             <a:r>
               <a:rPr lang="pl-PL" dirty="0" smtClean="0"/>
-              <a:t>Dalsza eksploracja wiedzy domenowej, spisanie jej oraz zaprezentowanie na forum </a:t>
-            </a:r>
-            <a:r>
-              <a:rPr lang="pl-PL" dirty="0" err="1" smtClean="0"/>
-              <a:t>publicum</a:t>
-            </a:r>
-            <a:endParaRPr lang="pl-PL" dirty="0" smtClean="0"/>
-          </a:p>
-          <a:p>
+              <a:t>Dalsza eksploracja wiedzy domenowej, spisanie jej oraz zaprezentowanie </a:t>
+            </a:r>
             <a:r>
               <a:rPr lang="pl-PL" dirty="0" smtClean="0"/>
-              <a:t>Sporządzenie pierwszych widoków dla aplikacji Windows 8 – czyli ekran startowy, główny ekran sprzedawcy oraz ekran „składania” zakupów.</a:t>
+              <a:t>na forum.</a:t>
             </a:r>
           </a:p>
           <a:p>
             <a:r>
               <a:rPr lang="pl-PL" dirty="0" smtClean="0"/>
-              <a:t>Zaprojektowanie logotypu, oraz wyglądów „kafelków”</a:t>
+              <a:t>Sporządzenie </a:t>
+            </a:r>
+            <a:r>
+              <a:rPr lang="pl-PL" dirty="0" smtClean="0"/>
+              <a:t>pierwszych widoków dla aplikacji Windows 8 – czyli ekran startowy, główny ekran sprzedawcy oraz ekran „składania” zakupów.</a:t>
+            </a:r>
+          </a:p>
+          <a:p>
+            <a:r>
+              <a:rPr lang="pl-PL" dirty="0" smtClean="0"/>
+              <a:t>Zaprojektowanie logotypu, oraz wyglądów „kafelek”</a:t>
             </a:r>
           </a:p>
           <a:p>

</xml_diff>